<commit_message>
Update Nicolas Fiquitiva Segura.pptx
</commit_message>
<xml_diff>
--- a/Nicolas Fiquitiva Segura/Nicolas Fiquitiva Segura.pptx
+++ b/Nicolas Fiquitiva Segura/Nicolas Fiquitiva Segura.pptx
@@ -9,7 +9,6 @@
   </p:notesMasterIdLst>
   <p:sldIdLst>
     <p:sldId id="256" r:id="rId3"/>
-    <p:sldId id="284" r:id="rId5"/>
   </p:sldIdLst>
   <p:sldSz cx="9144000" cy="5143500"/>
   <p:notesSz cx="6858000" cy="9144000"/>
@@ -681,105 +680,6 @@
 </file>
 
 <file path=ppt/notesSlides/notesSlide1.xml><?xml version="1.0" encoding="utf-8"?>
-<p:notes xmlns:a="http://schemas.openxmlformats.org/drawingml/2006/main" xmlns:r="http://schemas.openxmlformats.org/officeDocument/2006/relationships" xmlns:p="http://schemas.openxmlformats.org/presentationml/2006/main" showMasterPhAnim="0" showMasterSp="0">
-  <p:cSld>
-    <p:spTree>
-      <p:nvGrpSpPr>
-        <p:cNvPr id="50" name="Shape 50"/>
-        <p:cNvGrpSpPr/>
-        <p:nvPr/>
-      </p:nvGrpSpPr>
-      <p:grpSpPr>
-        <a:xfrm>
-          <a:off x="0" y="0"/>
-          <a:ext cx="0" cy="0"/>
-          <a:chOff x="0" y="0"/>
-          <a:chExt cx="0" cy="0"/>
-        </a:xfrm>
-      </p:grpSpPr>
-      <p:sp>
-        <p:nvSpPr>
-          <p:cNvPr id="51" name="Google Shape;51;g1e2cbc32b9d_0_40:notes"/>
-          <p:cNvSpPr/>
-          <p:nvPr>
-            <p:ph type="sldImg" idx="2"/>
-          </p:nvPr>
-        </p:nvSpPr>
-        <p:spPr>
-          <a:xfrm>
-            <a:off x="381300" y="685800"/>
-            <a:ext cx="6096000" cy="3429000"/>
-          </a:xfrm>
-          <a:custGeom>
-            <a:avLst/>
-            <a:gdLst/>
-            <a:ahLst/>
-            <a:cxnLst/>
-            <a:rect l="l" t="t" r="r" b="b"/>
-            <a:pathLst>
-              <a:path w="120000" h="120000" extrusionOk="0">
-                <a:moveTo>
-                  <a:pt x="0" y="0"/>
-                </a:moveTo>
-                <a:lnTo>
-                  <a:pt x="120000" y="0"/>
-                </a:lnTo>
-                <a:lnTo>
-                  <a:pt x="120000" y="120000"/>
-                </a:lnTo>
-                <a:lnTo>
-                  <a:pt x="0" y="120000"/>
-                </a:lnTo>
-                <a:close/>
-              </a:path>
-            </a:pathLst>
-          </a:custGeom>
-        </p:spPr>
-      </p:sp>
-      <p:sp>
-        <p:nvSpPr>
-          <p:cNvPr id="52" name="Google Shape;52;g1e2cbc32b9d_0_40:notes"/>
-          <p:cNvSpPr txBox="1"/>
-          <p:nvPr>
-            <p:ph type="body" idx="1"/>
-          </p:nvPr>
-        </p:nvSpPr>
-        <p:spPr>
-          <a:xfrm>
-            <a:off x="685800" y="4343400"/>
-            <a:ext cx="5486400" cy="4114800"/>
-          </a:xfrm>
-          <a:prstGeom prst="rect">
-            <a:avLst/>
-          </a:prstGeom>
-        </p:spPr>
-        <p:txBody>
-          <a:bodyPr spcFirstLastPara="1" wrap="square" lIns="91425" tIns="91425" rIns="91425" bIns="91425" anchor="t" anchorCtr="0">
-            <a:noAutofit/>
-          </a:bodyPr>
-          <a:lstStyle/>
-          <a:p>
-            <a:pPr marL="0" lvl="0" indent="0" algn="l" rtl="0">
-              <a:spcBef>
-                <a:spcPts val="0"/>
-              </a:spcBef>
-              <a:spcAft>
-                <a:spcPts val="0"/>
-              </a:spcAft>
-              <a:buNone/>
-            </a:pPr>
-          </a:p>
-        </p:txBody>
-      </p:sp>
-    </p:spTree>
-  </p:cSld>
-  <p:clrMapOvr>
-    <a:masterClrMapping/>
-  </p:clrMapOvr>
-</p:notes>
-</file>
-
-<file path=ppt/notesSlides/notesSlide2.xml><?xml version="1.0" encoding="utf-8"?>
 <p:notes xmlns:a="http://schemas.openxmlformats.org/drawingml/2006/main" xmlns:r="http://schemas.openxmlformats.org/officeDocument/2006/relationships" xmlns:p="http://schemas.openxmlformats.org/presentationml/2006/main" showMasterPhAnim="0" showMasterSp="0">
   <p:cSld>
     <p:spTree>
@@ -6280,7 +6180,7 @@
       </p:pic>
       <p:sp>
         <p:nvSpPr>
-          <p:cNvPr id="1" name="Google Shape;59;p13"/>
+          <p:cNvPr id="4" name="Google Shape;59;p13"/>
           <p:cNvSpPr/>
           <p:nvPr/>
         </p:nvSpPr>
@@ -6637,790 +6537,6 @@
             </p:seq>
           </p:childTnLst>
         </p:cTn>
-      </p:par>
-    </p:tnLst>
-  </p:timing>
-</p:sld>
-</file>
-
-<file path=ppt/slides/slide2.xml><?xml version="1.0" encoding="utf-8"?>
-<p:sld xmlns:a="http://schemas.openxmlformats.org/drawingml/2006/main" xmlns:r="http://schemas.openxmlformats.org/officeDocument/2006/relationships" xmlns:p="http://schemas.openxmlformats.org/presentationml/2006/main">
-  <p:cSld>
-    <p:spTree>
-      <p:nvGrpSpPr>
-        <p:cNvPr id="53" name="Shape 53"/>
-        <p:cNvGrpSpPr/>
-        <p:nvPr/>
-      </p:nvGrpSpPr>
-      <p:grpSpPr>
-        <a:xfrm>
-          <a:off x="0" y="0"/>
-          <a:ext cx="0" cy="0"/>
-          <a:chOff x="0" y="0"/>
-          <a:chExt cx="0" cy="0"/>
-        </a:xfrm>
-      </p:grpSpPr>
-      <p:sp>
-        <p:nvSpPr>
-          <p:cNvPr id="54" name="Google Shape;54;p13"/>
-          <p:cNvSpPr/>
-          <p:nvPr/>
-        </p:nvSpPr>
-        <p:spPr>
-          <a:xfrm>
-            <a:off x="394375" y="358575"/>
-            <a:ext cx="2717100" cy="2139900"/>
-          </a:xfrm>
-          <a:prstGeom prst="rect">
-            <a:avLst/>
-          </a:prstGeom>
-          <a:solidFill>
-            <a:schemeClr val="lt2"/>
-          </a:solidFill>
-          <a:ln w="9525" cap="flat" cmpd="sng">
-            <a:solidFill>
-              <a:schemeClr val="dk2"/>
-            </a:solidFill>
-            <a:prstDash val="solid"/>
-            <a:round/>
-            <a:headEnd type="none" w="sm" len="sm"/>
-            <a:tailEnd type="none" w="sm" len="sm"/>
-          </a:ln>
-        </p:spPr>
-        <p:txBody>
-          <a:bodyPr spcFirstLastPara="1" wrap="square" lIns="91425" tIns="91425" rIns="91425" bIns="91425" anchor="ctr" anchorCtr="0">
-            <a:noAutofit/>
-          </a:bodyPr>
-          <a:lstStyle/>
-          <a:p>
-            <a:pPr marL="0" lvl="0" indent="0" algn="l" rtl="0">
-              <a:spcBef>
-                <a:spcPts val="0"/>
-              </a:spcBef>
-              <a:spcAft>
-                <a:spcPts val="0"/>
-              </a:spcAft>
-              <a:buNone/>
-            </a:pPr>
-          </a:p>
-        </p:txBody>
-      </p:sp>
-      <p:sp>
-        <p:nvSpPr>
-          <p:cNvPr id="55" name="Google Shape;55;p13"/>
-          <p:cNvSpPr txBox="1"/>
-          <p:nvPr/>
-        </p:nvSpPr>
-        <p:spPr>
-          <a:xfrm>
-            <a:off x="252925" y="0"/>
-            <a:ext cx="3000000" cy="384900"/>
-          </a:xfrm>
-          <a:prstGeom prst="rect">
-            <a:avLst/>
-          </a:prstGeom>
-          <a:noFill/>
-          <a:ln>
-            <a:noFill/>
-          </a:ln>
-        </p:spPr>
-        <p:txBody>
-          <a:bodyPr spcFirstLastPara="1" wrap="square" lIns="91425" tIns="91425" rIns="91425" bIns="91425" anchor="t" anchorCtr="0">
-            <a:spAutoFit/>
-          </a:bodyPr>
-          <a:lstStyle/>
-          <a:p>
-            <a:pPr marL="0" lvl="0" indent="0" algn="ctr" rtl="0">
-              <a:lnSpc>
-                <a:spcPct val="120000"/>
-              </a:lnSpc>
-              <a:spcBef>
-                <a:spcPts val="0"/>
-              </a:spcBef>
-              <a:spcAft>
-                <a:spcPts val="0"/>
-              </a:spcAft>
-              <a:buNone/>
-            </a:pPr>
-            <a:r>
-              <a:rPr lang="en-US" sz="1300">
-                <a:solidFill>
-                  <a:srgbClr val="006666"/>
-                </a:solidFill>
-              </a:rPr>
-              <a:t>Lo que me apasiona</a:t>
-            </a:r>
-            <a:endParaRPr lang="en-US" sz="1300">
-              <a:solidFill>
-                <a:srgbClr val="006666"/>
-              </a:solidFill>
-            </a:endParaRPr>
-          </a:p>
-        </p:txBody>
-      </p:sp>
-      <p:sp>
-        <p:nvSpPr>
-          <p:cNvPr id="56" name="Google Shape;56;p13"/>
-          <p:cNvSpPr txBox="1"/>
-          <p:nvPr/>
-        </p:nvSpPr>
-        <p:spPr>
-          <a:xfrm>
-            <a:off x="3488550" y="2039425"/>
-            <a:ext cx="2166900" cy="400200"/>
-          </a:xfrm>
-          <a:prstGeom prst="rect">
-            <a:avLst/>
-          </a:prstGeom>
-          <a:noFill/>
-          <a:ln>
-            <a:noFill/>
-          </a:ln>
-        </p:spPr>
-        <p:txBody>
-          <a:bodyPr spcFirstLastPara="1" wrap="square" lIns="91425" tIns="91425" rIns="91425" bIns="91425" anchor="t" anchorCtr="0">
-            <a:spAutoFit/>
-          </a:bodyPr>
-          <a:lstStyle/>
-          <a:p>
-            <a:pPr marL="0" lvl="0" indent="0" algn="ctr" rtl="0">
-              <a:lnSpc>
-                <a:spcPct val="120000"/>
-              </a:lnSpc>
-              <a:spcBef>
-                <a:spcPts val="0"/>
-              </a:spcBef>
-              <a:spcAft>
-                <a:spcPts val="0"/>
-              </a:spcAft>
-              <a:buNone/>
-            </a:pPr>
-            <a:r>
-              <a:rPr lang="en-US" b="1">
-                <a:solidFill>
-                  <a:srgbClr val="00796B"/>
-                </a:solidFill>
-              </a:rPr>
-              <a:t>Pon tu foto acá</a:t>
-            </a:r>
-            <a:endParaRPr b="1">
-              <a:solidFill>
-                <a:srgbClr val="00796B"/>
-              </a:solidFill>
-            </a:endParaRPr>
-          </a:p>
-        </p:txBody>
-      </p:sp>
-      <p:sp>
-        <p:nvSpPr>
-          <p:cNvPr id="59" name="Google Shape;59;p13"/>
-          <p:cNvSpPr/>
-          <p:nvPr/>
-        </p:nvSpPr>
-        <p:spPr>
-          <a:xfrm>
-            <a:off x="6169065" y="2912455"/>
-            <a:ext cx="2717100" cy="2139900"/>
-          </a:xfrm>
-          <a:prstGeom prst="rect">
-            <a:avLst/>
-          </a:prstGeom>
-          <a:solidFill>
-            <a:schemeClr val="lt2"/>
-          </a:solidFill>
-          <a:ln w="9525" cap="flat" cmpd="sng">
-            <a:solidFill>
-              <a:schemeClr val="dk2"/>
-            </a:solidFill>
-            <a:prstDash val="solid"/>
-            <a:round/>
-            <a:headEnd type="none" w="sm" len="sm"/>
-            <a:tailEnd type="none" w="sm" len="sm"/>
-          </a:ln>
-        </p:spPr>
-        <p:txBody>
-          <a:bodyPr spcFirstLastPara="1" wrap="square" lIns="91425" tIns="91425" rIns="91425" bIns="91425" anchor="ctr" anchorCtr="0">
-            <a:noAutofit/>
-          </a:bodyPr>
-          <a:lstStyle/>
-          <a:p>
-            <a:pPr marL="0" lvl="0" indent="0" algn="l" rtl="0">
-              <a:spcBef>
-                <a:spcPts val="0"/>
-              </a:spcBef>
-              <a:spcAft>
-                <a:spcPts val="0"/>
-              </a:spcAft>
-              <a:buNone/>
-            </a:pPr>
-          </a:p>
-        </p:txBody>
-      </p:sp>
-      <p:sp>
-        <p:nvSpPr>
-          <p:cNvPr id="60" name="Google Shape;60;p13"/>
-          <p:cNvSpPr txBox="1"/>
-          <p:nvPr/>
-        </p:nvSpPr>
-        <p:spPr>
-          <a:xfrm>
-            <a:off x="5668010" y="2498725"/>
-            <a:ext cx="3760470" cy="633730"/>
-          </a:xfrm>
-          <a:prstGeom prst="rect">
-            <a:avLst/>
-          </a:prstGeom>
-          <a:noFill/>
-          <a:ln>
-            <a:noFill/>
-          </a:ln>
-        </p:spPr>
-        <p:txBody>
-          <a:bodyPr spcFirstLastPara="1" wrap="square" lIns="91425" tIns="91425" rIns="91425" bIns="91425" anchor="t" anchorCtr="0">
-            <a:spAutoFit/>
-          </a:bodyPr>
-          <a:lstStyle/>
-          <a:p>
-            <a:pPr marL="0" lvl="0" indent="0" algn="ctr" rtl="0">
-              <a:lnSpc>
-                <a:spcPct val="120000"/>
-              </a:lnSpc>
-              <a:spcBef>
-                <a:spcPts val="0"/>
-              </a:spcBef>
-              <a:spcAft>
-                <a:spcPts val="0"/>
-              </a:spcAft>
-              <a:buNone/>
-            </a:pPr>
-            <a:r>
-              <a:rPr lang="es-ES">
-                <a:solidFill>
-                  <a:srgbClr val="006666"/>
-                </a:solidFill>
-              </a:rPr>
-              <a:t>¿Que expectativas tengo del curso? </a:t>
-            </a:r>
-            <a:endParaRPr>
-              <a:solidFill>
-                <a:srgbClr val="006666"/>
-              </a:solidFill>
-            </a:endParaRPr>
-          </a:p>
-          <a:p>
-            <a:pPr marL="0" lvl="0" indent="0" algn="l" rtl="0">
-              <a:lnSpc>
-                <a:spcPct val="115000"/>
-              </a:lnSpc>
-              <a:spcBef>
-                <a:spcPts val="0"/>
-              </a:spcBef>
-              <a:spcAft>
-                <a:spcPts val="0"/>
-              </a:spcAft>
-              <a:buNone/>
-            </a:pPr>
-            <a:endParaRPr sz="1100">
-              <a:solidFill>
-                <a:schemeClr val="dk1"/>
-              </a:solidFill>
-            </a:endParaRPr>
-          </a:p>
-        </p:txBody>
-      </p:sp>
-      <p:sp>
-        <p:nvSpPr>
-          <p:cNvPr id="61" name="Google Shape;61;p13"/>
-          <p:cNvSpPr txBox="1"/>
-          <p:nvPr/>
-        </p:nvSpPr>
-        <p:spPr>
-          <a:xfrm>
-            <a:off x="3072000" y="2391800"/>
-            <a:ext cx="3000000" cy="892175"/>
-          </a:xfrm>
-          <a:prstGeom prst="rect">
-            <a:avLst/>
-          </a:prstGeom>
-          <a:noFill/>
-          <a:ln>
-            <a:noFill/>
-          </a:ln>
-        </p:spPr>
-        <p:txBody>
-          <a:bodyPr spcFirstLastPara="1" wrap="square" lIns="91425" tIns="91425" rIns="91425" bIns="91425" anchor="t" anchorCtr="0">
-            <a:spAutoFit/>
-          </a:bodyPr>
-          <a:lstStyle/>
-          <a:p>
-            <a:pPr marL="0" lvl="0" indent="0" algn="ctr" rtl="0">
-              <a:lnSpc>
-                <a:spcPct val="120000"/>
-              </a:lnSpc>
-              <a:spcBef>
-                <a:spcPts val="0"/>
-              </a:spcBef>
-              <a:spcAft>
-                <a:spcPts val="0"/>
-              </a:spcAft>
-              <a:buNone/>
-            </a:pPr>
-            <a:r>
-              <a:rPr lang="en-US" b="1">
-                <a:solidFill>
-                  <a:schemeClr val="dk1"/>
-                </a:solidFill>
-              </a:rPr>
-              <a:t>Me gusta que me llamen…  </a:t>
-            </a:r>
-            <a:endParaRPr b="1">
-              <a:solidFill>
-                <a:schemeClr val="dk1"/>
-              </a:solidFill>
-              <a:highlight>
-                <a:srgbClr val="00FFFF"/>
-              </a:highlight>
-            </a:endParaRPr>
-          </a:p>
-          <a:p>
-            <a:pPr marL="0" lvl="0" indent="0" algn="ctr" rtl="0">
-              <a:lnSpc>
-                <a:spcPct val="120000"/>
-              </a:lnSpc>
-              <a:spcBef>
-                <a:spcPts val="0"/>
-              </a:spcBef>
-              <a:spcAft>
-                <a:spcPts val="0"/>
-              </a:spcAft>
-              <a:buNone/>
-            </a:pPr>
-            <a:r>
-              <a:rPr lang="es-ES" b="1">
-                <a:solidFill>
-                  <a:schemeClr val="dk1"/>
-                </a:solidFill>
-                <a:highlight>
-                  <a:srgbClr val="00FFFF"/>
-                </a:highlight>
-              </a:rPr>
-              <a:t>___________</a:t>
-            </a:r>
-            <a:endParaRPr b="1">
-              <a:solidFill>
-                <a:schemeClr val="dk1"/>
-              </a:solidFill>
-              <a:highlight>
-                <a:srgbClr val="00FFFF"/>
-              </a:highlight>
-            </a:endParaRPr>
-          </a:p>
-          <a:p>
-            <a:pPr marL="0" lvl="0" indent="0" algn="l" rtl="0">
-              <a:lnSpc>
-                <a:spcPct val="115000"/>
-              </a:lnSpc>
-              <a:spcBef>
-                <a:spcPts val="0"/>
-              </a:spcBef>
-              <a:spcAft>
-                <a:spcPts val="0"/>
-              </a:spcAft>
-              <a:buNone/>
-            </a:pPr>
-            <a:endParaRPr sz="1100">
-              <a:solidFill>
-                <a:schemeClr val="dk1"/>
-              </a:solidFill>
-            </a:endParaRPr>
-          </a:p>
-        </p:txBody>
-      </p:sp>
-      <p:sp>
-        <p:nvSpPr>
-          <p:cNvPr id="62" name="Google Shape;62;p13"/>
-          <p:cNvSpPr/>
-          <p:nvPr/>
-        </p:nvSpPr>
-        <p:spPr>
-          <a:xfrm>
-            <a:off x="394360" y="3003260"/>
-            <a:ext cx="2717100" cy="2139900"/>
-          </a:xfrm>
-          <a:prstGeom prst="rect">
-            <a:avLst/>
-          </a:prstGeom>
-          <a:solidFill>
-            <a:schemeClr val="lt2"/>
-          </a:solidFill>
-          <a:ln w="9525" cap="flat" cmpd="sng">
-            <a:solidFill>
-              <a:schemeClr val="dk2"/>
-            </a:solidFill>
-            <a:prstDash val="solid"/>
-            <a:round/>
-            <a:headEnd type="none" w="sm" len="sm"/>
-            <a:tailEnd type="none" w="sm" len="sm"/>
-          </a:ln>
-        </p:spPr>
-        <p:txBody>
-          <a:bodyPr spcFirstLastPara="1" wrap="square" lIns="91425" tIns="91425" rIns="91425" bIns="91425" anchor="ctr" anchorCtr="0">
-            <a:noAutofit/>
-          </a:bodyPr>
-          <a:lstStyle/>
-          <a:p>
-            <a:pPr marL="0" lvl="0" indent="0" algn="l" rtl="0">
-              <a:spcBef>
-                <a:spcPts val="0"/>
-              </a:spcBef>
-              <a:spcAft>
-                <a:spcPts val="0"/>
-              </a:spcAft>
-              <a:buNone/>
-            </a:pPr>
-            <a:endParaRPr lang="es-ES" sz="2000">
-              <a:solidFill>
-                <a:schemeClr val="dk1"/>
-              </a:solidFill>
-            </a:endParaRPr>
-          </a:p>
-        </p:txBody>
-      </p:sp>
-      <p:pic>
-        <p:nvPicPr>
-          <p:cNvPr id="63" name="Google Shape;63;p13"/>
-          <p:cNvPicPr preferRelativeResize="0"/>
-          <p:nvPr/>
-        </p:nvPicPr>
-        <p:blipFill>
-          <a:blip r:embed="rId1"/>
-          <a:stretch>
-            <a:fillRect/>
-          </a:stretch>
-        </p:blipFill>
-        <p:spPr>
-          <a:xfrm>
-            <a:off x="8686800" y="4686300"/>
-            <a:ext cx="457200" cy="457200"/>
-          </a:xfrm>
-          <a:prstGeom prst="rect">
-            <a:avLst/>
-          </a:prstGeom>
-          <a:noFill/>
-          <a:ln>
-            <a:noFill/>
-          </a:ln>
-        </p:spPr>
-      </p:pic>
-      <p:sp>
-        <p:nvSpPr>
-          <p:cNvPr id="64" name="Google Shape;64;p13"/>
-          <p:cNvSpPr txBox="1"/>
-          <p:nvPr/>
-        </p:nvSpPr>
-        <p:spPr>
-          <a:xfrm>
-            <a:off x="228980" y="2650640"/>
-            <a:ext cx="3000000" cy="612600"/>
-          </a:xfrm>
-          <a:prstGeom prst="rect">
-            <a:avLst/>
-          </a:prstGeom>
-          <a:noFill/>
-          <a:ln>
-            <a:noFill/>
-          </a:ln>
-        </p:spPr>
-        <p:txBody>
-          <a:bodyPr spcFirstLastPara="1" wrap="square" lIns="91425" tIns="91425" rIns="91425" bIns="91425" anchor="t" anchorCtr="0">
-            <a:spAutoFit/>
-          </a:bodyPr>
-          <a:lstStyle/>
-          <a:p>
-            <a:pPr marL="0" lvl="0" indent="0" algn="ctr" rtl="0">
-              <a:lnSpc>
-                <a:spcPct val="120000"/>
-              </a:lnSpc>
-              <a:spcBef>
-                <a:spcPts val="0"/>
-              </a:spcBef>
-              <a:spcAft>
-                <a:spcPts val="0"/>
-              </a:spcAft>
-              <a:buNone/>
-            </a:pPr>
-            <a:r>
-              <a:rPr lang="en-US">
-                <a:solidFill>
-                  <a:srgbClr val="006666"/>
-                </a:solidFill>
-              </a:rPr>
-              <a:t>Mi Ocupación ó Hobbie</a:t>
-            </a:r>
-            <a:endParaRPr>
-              <a:solidFill>
-                <a:srgbClr val="006666"/>
-              </a:solidFill>
-            </a:endParaRPr>
-          </a:p>
-          <a:p>
-            <a:pPr marL="0" lvl="0" indent="0" algn="l" rtl="0">
-              <a:lnSpc>
-                <a:spcPct val="115000"/>
-              </a:lnSpc>
-              <a:spcBef>
-                <a:spcPts val="0"/>
-              </a:spcBef>
-              <a:spcAft>
-                <a:spcPts val="0"/>
-              </a:spcAft>
-              <a:buNone/>
-            </a:pPr>
-            <a:endParaRPr sz="1100">
-              <a:solidFill>
-                <a:schemeClr val="dk1"/>
-              </a:solidFill>
-            </a:endParaRPr>
-          </a:p>
-        </p:txBody>
-      </p:sp>
-      <p:pic>
-        <p:nvPicPr>
-          <p:cNvPr id="74" name="Google Shape;74;p13"/>
-          <p:cNvPicPr preferRelativeResize="0"/>
-          <p:nvPr/>
-        </p:nvPicPr>
-        <p:blipFill>
-          <a:blip r:embed="rId2"/>
-          <a:stretch>
-            <a:fillRect/>
-          </a:stretch>
-        </p:blipFill>
-        <p:spPr>
-          <a:xfrm>
-            <a:off x="0" y="0"/>
-            <a:ext cx="514350" cy="514350"/>
-          </a:xfrm>
-          <a:prstGeom prst="rect">
-            <a:avLst/>
-          </a:prstGeom>
-          <a:noFill/>
-          <a:ln>
-            <a:noFill/>
-          </a:ln>
-        </p:spPr>
-      </p:pic>
-      <p:sp>
-        <p:nvSpPr>
-          <p:cNvPr id="1" name="Google Shape;59;p13"/>
-          <p:cNvSpPr/>
-          <p:nvPr/>
-        </p:nvSpPr>
-        <p:spPr>
-          <a:xfrm>
-            <a:off x="6169700" y="358485"/>
-            <a:ext cx="2717100" cy="2139900"/>
-          </a:xfrm>
-          <a:prstGeom prst="rect">
-            <a:avLst/>
-          </a:prstGeom>
-          <a:solidFill>
-            <a:schemeClr val="lt2"/>
-          </a:solidFill>
-          <a:ln w="9525" cap="flat" cmpd="sng">
-            <a:solidFill>
-              <a:schemeClr val="dk2"/>
-            </a:solidFill>
-            <a:prstDash val="solid"/>
-            <a:round/>
-            <a:headEnd type="none" w="sm" len="sm"/>
-            <a:tailEnd type="none" w="sm" len="sm"/>
-          </a:ln>
-        </p:spPr>
-        <p:txBody>
-          <a:bodyPr spcFirstLastPara="1" wrap="square" lIns="91425" tIns="91425" rIns="91425" bIns="91425" anchor="ctr" anchorCtr="0">
-            <a:noAutofit/>
-          </a:bodyPr>
-          <a:p>
-            <a:pPr marL="0" lvl="0" indent="0" algn="l" rtl="0">
-              <a:spcBef>
-                <a:spcPts val="0"/>
-              </a:spcBef>
-              <a:spcAft>
-                <a:spcPts val="0"/>
-              </a:spcAft>
-              <a:buNone/>
-            </a:pPr>
-          </a:p>
-        </p:txBody>
-      </p:sp>
-      <p:pic>
-        <p:nvPicPr>
-          <p:cNvPr id="57" name="Google Shape;57;p13"/>
-          <p:cNvPicPr preferRelativeResize="0"/>
-          <p:nvPr/>
-        </p:nvPicPr>
-        <p:blipFill>
-          <a:blip r:embed="rId3"/>
-          <a:stretch>
-            <a:fillRect/>
-          </a:stretch>
-        </p:blipFill>
-        <p:spPr>
-          <a:xfrm>
-            <a:off x="8610600" y="0"/>
-            <a:ext cx="533400" cy="533400"/>
-          </a:xfrm>
-          <a:prstGeom prst="rect">
-            <a:avLst/>
-          </a:prstGeom>
-          <a:noFill/>
-          <a:ln>
-            <a:noFill/>
-          </a:ln>
-        </p:spPr>
-      </p:pic>
-      <p:sp>
-        <p:nvSpPr>
-          <p:cNvPr id="3" name="Google Shape;60;p13"/>
-          <p:cNvSpPr txBox="1"/>
-          <p:nvPr/>
-        </p:nvSpPr>
-        <p:spPr>
-          <a:xfrm>
-            <a:off x="6169025" y="259715"/>
-            <a:ext cx="2716530" cy="1118235"/>
-          </a:xfrm>
-          <a:prstGeom prst="rect">
-            <a:avLst/>
-          </a:prstGeom>
-          <a:noFill/>
-          <a:ln>
-            <a:noFill/>
-          </a:ln>
-        </p:spPr>
-        <p:txBody>
-          <a:bodyPr spcFirstLastPara="1" wrap="square" lIns="91425" tIns="91425" rIns="91425" bIns="91425" anchor="t" anchorCtr="0">
-            <a:spAutoFit/>
-          </a:bodyPr>
-          <a:p>
-            <a:pPr marL="0" lvl="0" indent="0" algn="l" rtl="0">
-              <a:lnSpc>
-                <a:spcPct val="115000"/>
-              </a:lnSpc>
-              <a:spcBef>
-                <a:spcPts val="0"/>
-              </a:spcBef>
-              <a:spcAft>
-                <a:spcPts val="0"/>
-              </a:spcAft>
-              <a:buNone/>
-            </a:pPr>
-            <a:r>
-              <a:rPr lang="es-ES">
-                <a:solidFill>
-                  <a:srgbClr val="006666"/>
-                </a:solidFill>
-              </a:rPr>
-              <a:t>¿Cuales son los programas que mas uso?</a:t>
-            </a:r>
-            <a:endParaRPr lang="es-ES">
-              <a:solidFill>
-                <a:srgbClr val="006666"/>
-              </a:solidFill>
-            </a:endParaRPr>
-          </a:p>
-          <a:p>
-            <a:pPr marL="0" lvl="0" indent="0" algn="l" rtl="0">
-              <a:lnSpc>
-                <a:spcPct val="115000"/>
-              </a:lnSpc>
-              <a:spcBef>
-                <a:spcPts val="0"/>
-              </a:spcBef>
-              <a:spcAft>
-                <a:spcPts val="0"/>
-              </a:spcAft>
-              <a:buNone/>
-            </a:pPr>
-            <a:endParaRPr lang="es-ES" sz="1100">
-              <a:solidFill>
-                <a:schemeClr val="dk1"/>
-              </a:solidFill>
-            </a:endParaRPr>
-          </a:p>
-          <a:p>
-            <a:pPr marL="0" lvl="0" indent="0" algn="l" rtl="0">
-              <a:lnSpc>
-                <a:spcPct val="115000"/>
-              </a:lnSpc>
-              <a:spcBef>
-                <a:spcPts val="0"/>
-              </a:spcBef>
-              <a:spcAft>
-                <a:spcPts val="0"/>
-              </a:spcAft>
-              <a:buNone/>
-            </a:pPr>
-            <a:r>
-              <a:rPr lang="es-ES" sz="1400">
-                <a:solidFill>
-                  <a:srgbClr val="006666"/>
-                </a:solidFill>
-              </a:rPr>
-              <a:t>Mi experiencia tecnologica:</a:t>
-            </a:r>
-            <a:r>
-              <a:rPr lang="es-ES" sz="1100">
-                <a:solidFill>
-                  <a:schemeClr val="dk1"/>
-                </a:solidFill>
-              </a:rPr>
-              <a:t> </a:t>
-            </a:r>
-            <a:endParaRPr lang="es-ES" sz="1100">
-              <a:solidFill>
-                <a:schemeClr val="dk1"/>
-              </a:solidFill>
-            </a:endParaRPr>
-          </a:p>
-        </p:txBody>
-      </p:sp>
-      <p:pic>
-        <p:nvPicPr>
-          <p:cNvPr id="585" name="Google Shape;585;p34"/>
-          <p:cNvPicPr preferRelativeResize="0"/>
-          <p:nvPr/>
-        </p:nvPicPr>
-        <p:blipFill>
-          <a:blip r:embed="rId4"/>
-          <a:stretch>
-            <a:fillRect/>
-          </a:stretch>
-        </p:blipFill>
-        <p:spPr>
-          <a:xfrm>
-            <a:off x="3667125" y="533400"/>
-            <a:ext cx="1809750" cy="1323975"/>
-          </a:xfrm>
-          <a:prstGeom prst="rect">
-            <a:avLst/>
-          </a:prstGeom>
-          <a:noFill/>
-          <a:ln>
-            <a:noFill/>
-          </a:ln>
-        </p:spPr>
-      </p:pic>
-    </p:spTree>
-  </p:cSld>
-  <p:clrMapOvr>
-    <a:masterClrMapping/>
-  </p:clrMapOvr>
-  <p:timing>
-    <p:tnLst>
-      <p:par>
-        <p:cTn id="1" dur="indefinite" restart="never" nodeType="tmRoot"/>
       </p:par>
     </p:tnLst>
   </p:timing>

</xml_diff>